<commit_message>
done as can be part 3
</commit_message>
<xml_diff>
--- a/352 project presentation.pptx
+++ b/352 project presentation.pptx
@@ -10,7 +10,7 @@
     <p:sldId id="258" r:id="rId4"/>
     <p:sldId id="259" r:id="rId5"/>
     <p:sldId id="260" r:id="rId6"/>
-    <p:sldId id="261" r:id="rId7"/>
+    <p:sldId id="264" r:id="rId7"/>
     <p:sldId id="262" r:id="rId8"/>
     <p:sldId id="263" r:id="rId9"/>
   </p:sldIdLst>
@@ -315,7 +315,7 @@
             <a:fld id="{B61BEF0D-F0BB-DE4B-95CE-6DB70DBA9567}" type="datetimeFigureOut">
               <a:rPr lang="en-US" dirty="0"/>
               <a:pPr/>
-              <a:t>12/6/2017</a:t>
+              <a:t>12/7/2017</a:t>
             </a:fld>
             <a:endParaRPr lang="en-US" dirty="0"/>
           </a:p>
@@ -748,7 +748,7 @@
             <a:fld id="{B61BEF0D-F0BB-DE4B-95CE-6DB70DBA9567}" type="datetimeFigureOut">
               <a:rPr lang="en-US" dirty="0"/>
               <a:pPr/>
-              <a:t>12/6/2017</a:t>
+              <a:t>12/7/2017</a:t>
             </a:fld>
             <a:endParaRPr lang="en-US" dirty="0"/>
           </a:p>
@@ -995,7 +995,7 @@
             <a:fld id="{B61BEF0D-F0BB-DE4B-95CE-6DB70DBA9567}" type="datetimeFigureOut">
               <a:rPr lang="en-US" dirty="0"/>
               <a:pPr/>
-              <a:t>12/6/2017</a:t>
+              <a:t>12/7/2017</a:t>
             </a:fld>
             <a:endParaRPr lang="en-US" dirty="0"/>
           </a:p>
@@ -1300,7 +1300,7 @@
             <a:fld id="{B61BEF0D-F0BB-DE4B-95CE-6DB70DBA9567}" type="datetimeFigureOut">
               <a:rPr lang="en-US" dirty="0"/>
               <a:pPr/>
-              <a:t>12/6/2017</a:t>
+              <a:t>12/7/2017</a:t>
             </a:fld>
             <a:endParaRPr lang="en-US" dirty="0"/>
           </a:p>
@@ -1615,7 +1615,7 @@
             <a:fld id="{B61BEF0D-F0BB-DE4B-95CE-6DB70DBA9567}" type="datetimeFigureOut">
               <a:rPr lang="en-US" dirty="0"/>
               <a:pPr/>
-              <a:t>12/6/2017</a:t>
+              <a:t>12/7/2017</a:t>
             </a:fld>
             <a:endParaRPr lang="en-US" dirty="0"/>
           </a:p>
@@ -1914,7 +1914,7 @@
             <a:fld id="{B61BEF0D-F0BB-DE4B-95CE-6DB70DBA9567}" type="datetimeFigureOut">
               <a:rPr lang="en-US" dirty="0"/>
               <a:pPr/>
-              <a:t>12/6/2017</a:t>
+              <a:t>12/7/2017</a:t>
             </a:fld>
             <a:endParaRPr lang="en-US" dirty="0"/>
           </a:p>
@@ -2278,7 +2278,7 @@
             <a:fld id="{B61BEF0D-F0BB-DE4B-95CE-6DB70DBA9567}" type="datetimeFigureOut">
               <a:rPr lang="en-US" dirty="0"/>
               <a:pPr/>
-              <a:t>12/6/2017</a:t>
+              <a:t>12/7/2017</a:t>
             </a:fld>
             <a:endParaRPr lang="en-US" dirty="0"/>
           </a:p>
@@ -2449,7 +2449,7 @@
             <a:fld id="{B61BEF0D-F0BB-DE4B-95CE-6DB70DBA9567}" type="datetimeFigureOut">
               <a:rPr lang="en-US" dirty="0"/>
               <a:pPr/>
-              <a:t>12/6/2017</a:t>
+              <a:t>12/7/2017</a:t>
             </a:fld>
             <a:endParaRPr lang="en-US" dirty="0"/>
           </a:p>
@@ -2626,7 +2626,7 @@
             <a:fld id="{B61BEF0D-F0BB-DE4B-95CE-6DB70DBA9567}" type="datetimeFigureOut">
               <a:rPr lang="en-US" dirty="0"/>
               <a:pPr/>
-              <a:t>12/6/2017</a:t>
+              <a:t>12/7/2017</a:t>
             </a:fld>
             <a:endParaRPr lang="en-US" dirty="0"/>
           </a:p>
@@ -2793,7 +2793,7 @@
             <a:fld id="{B61BEF0D-F0BB-DE4B-95CE-6DB70DBA9567}" type="datetimeFigureOut">
               <a:rPr lang="en-US" dirty="0"/>
               <a:pPr/>
-              <a:t>12/6/2017</a:t>
+              <a:t>12/7/2017</a:t>
             </a:fld>
             <a:endParaRPr lang="en-US" dirty="0"/>
           </a:p>
@@ -3040,7 +3040,7 @@
             <a:fld id="{B61BEF0D-F0BB-DE4B-95CE-6DB70DBA9567}" type="datetimeFigureOut">
               <a:rPr lang="en-US" dirty="0"/>
               <a:pPr/>
-              <a:t>12/6/2017</a:t>
+              <a:t>12/7/2017</a:t>
             </a:fld>
             <a:endParaRPr lang="en-US" dirty="0"/>
           </a:p>
@@ -3273,7 +3273,7 @@
             <a:fld id="{B61BEF0D-F0BB-DE4B-95CE-6DB70DBA9567}" type="datetimeFigureOut">
               <a:rPr lang="en-US" dirty="0"/>
               <a:pPr/>
-              <a:t>12/6/2017</a:t>
+              <a:t>12/7/2017</a:t>
             </a:fld>
             <a:endParaRPr lang="en-US" dirty="0"/>
           </a:p>
@@ -3652,7 +3652,7 @@
             <a:fld id="{B61BEF0D-F0BB-DE4B-95CE-6DB70DBA9567}" type="datetimeFigureOut">
               <a:rPr lang="en-US" dirty="0"/>
               <a:pPr/>
-              <a:t>12/6/2017</a:t>
+              <a:t>12/7/2017</a:t>
             </a:fld>
             <a:endParaRPr lang="en-US" dirty="0"/>
           </a:p>
@@ -3767,7 +3767,7 @@
             <a:fld id="{B61BEF0D-F0BB-DE4B-95CE-6DB70DBA9567}" type="datetimeFigureOut">
               <a:rPr lang="en-US" dirty="0"/>
               <a:pPr/>
-              <a:t>12/6/2017</a:t>
+              <a:t>12/7/2017</a:t>
             </a:fld>
             <a:endParaRPr lang="en-US" dirty="0"/>
           </a:p>
@@ -3859,7 +3859,7 @@
             <a:fld id="{B61BEF0D-F0BB-DE4B-95CE-6DB70DBA9567}" type="datetimeFigureOut">
               <a:rPr lang="en-US" dirty="0"/>
               <a:pPr/>
-              <a:t>12/6/2017</a:t>
+              <a:t>12/7/2017</a:t>
             </a:fld>
             <a:endParaRPr lang="en-US" dirty="0"/>
           </a:p>
@@ -4111,7 +4111,7 @@
             <a:fld id="{B61BEF0D-F0BB-DE4B-95CE-6DB70DBA9567}" type="datetimeFigureOut">
               <a:rPr lang="en-US" dirty="0"/>
               <a:pPr/>
-              <a:t>12/6/2017</a:t>
+              <a:t>12/7/2017</a:t>
             </a:fld>
             <a:endParaRPr lang="en-US" dirty="0"/>
           </a:p>
@@ -4391,7 +4391,7 @@
             <a:fld id="{B61BEF0D-F0BB-DE4B-95CE-6DB70DBA9567}" type="datetimeFigureOut">
               <a:rPr lang="en-US" dirty="0"/>
               <a:pPr/>
-              <a:t>12/6/2017</a:t>
+              <a:t>12/7/2017</a:t>
             </a:fld>
             <a:endParaRPr lang="en-US" dirty="0"/>
           </a:p>
@@ -4794,7 +4794,7 @@
             <a:fld id="{B61BEF0D-F0BB-DE4B-95CE-6DB70DBA9567}" type="datetimeFigureOut">
               <a:rPr lang="en-US" dirty="0"/>
               <a:pPr/>
-              <a:t>12/6/2017</a:t>
+              <a:t>12/7/2017</a:t>
             </a:fld>
             <a:endParaRPr lang="en-US" dirty="0"/>
           </a:p>
@@ -5343,16 +5343,18 @@
         </p:nvSpPr>
         <p:spPr>
           <a:xfrm>
-            <a:off x="684212" y="685800"/>
-            <a:ext cx="8001000" cy="1033944"/>
+            <a:off x="684212" y="-263106"/>
+            <a:ext cx="10599139" cy="2195423"/>
           </a:xfrm>
         </p:spPr>
         <p:txBody>
-          <a:bodyPr/>
-          <a:lstStyle/>
-          <a:p>
-            <a:r>
-              <a:rPr lang="en-US" dirty="0"/>
+          <a:bodyPr>
+            <a:normAutofit/>
+          </a:bodyPr>
+          <a:lstStyle/>
+          <a:p>
+            <a:r>
+              <a:rPr lang="en-US" sz="6600" dirty="0"/>
               <a:t>Financial manager</a:t>
             </a:r>
           </a:p>
@@ -5376,25 +5378,27 @@
         </p:nvSpPr>
         <p:spPr>
           <a:xfrm>
-            <a:off x="684212" y="1847287"/>
-            <a:ext cx="6400800" cy="1947333"/>
+            <a:off x="684212" y="3296525"/>
+            <a:ext cx="6400800" cy="3290970"/>
           </a:xfrm>
         </p:spPr>
         <p:txBody>
-          <a:bodyPr/>
-          <a:lstStyle/>
-          <a:p>
-            <a:r>
-              <a:rPr lang="en-US" dirty="0"/>
+          <a:bodyPr>
+            <a:normAutofit/>
+          </a:bodyPr>
+          <a:lstStyle/>
+          <a:p>
+            <a:r>
+              <a:rPr lang="en-US" sz="3600" dirty="0"/>
               <a:t>Course Project for CSCI 352</a:t>
             </a:r>
           </a:p>
           <a:p>
-            <a:endParaRPr lang="en-US" dirty="0"/>
-          </a:p>
-          <a:p>
-            <a:r>
-              <a:rPr lang="en-US" dirty="0"/>
+            <a:endParaRPr lang="en-US" sz="3600" dirty="0"/>
+          </a:p>
+          <a:p>
+            <a:r>
+              <a:rPr lang="en-US" sz="3600" dirty="0"/>
               <a:t>Lucian Freeze/Brett Whitson</a:t>
             </a:r>
           </a:p>
@@ -5453,11 +5457,13 @@
           </a:xfrm>
         </p:spPr>
         <p:txBody>
-          <a:bodyPr/>
-          <a:lstStyle/>
-          <a:p>
-            <a:r>
-              <a:rPr lang="en-US" dirty="0"/>
+          <a:bodyPr>
+            <a:normAutofit/>
+          </a:bodyPr>
+          <a:lstStyle/>
+          <a:p>
+            <a:r>
+              <a:rPr lang="en-US" sz="6000" dirty="0"/>
               <a:t>Overview</a:t>
             </a:r>
           </a:p>
@@ -5481,47 +5487,48 @@
         </p:nvSpPr>
         <p:spPr>
           <a:xfrm>
-            <a:off x="684212" y="1493240"/>
-            <a:ext cx="8534400" cy="2983996"/>
+            <a:off x="684212" y="1493239"/>
+            <a:ext cx="8534400" cy="5209485"/>
           </a:xfrm>
         </p:spPr>
         <p:txBody>
-          <a:bodyPr/>
-          <a:lstStyle/>
-          <a:p>
-            <a:r>
-              <a:rPr lang="en-US" dirty="0"/>
+          <a:bodyPr>
+            <a:normAutofit/>
+          </a:bodyPr>
+          <a:lstStyle/>
+          <a:p>
+            <a:r>
+              <a:rPr lang="en-US" sz="3600" dirty="0"/>
               <a:t>Background</a:t>
             </a:r>
           </a:p>
           <a:p>
             <a:r>
-              <a:rPr lang="en-US" dirty="0"/>
+              <a:rPr lang="en-US" sz="3600" dirty="0"/>
               <a:t>Approach</a:t>
             </a:r>
           </a:p>
           <a:p>
             <a:r>
-              <a:rPr lang="en-US" dirty="0" smtClean="0"/>
+              <a:rPr lang="en-US" sz="3600" dirty="0"/>
               <a:t>Diagrams</a:t>
             </a:r>
-            <a:endParaRPr lang="en-US" dirty="0"/>
-          </a:p>
-          <a:p>
-            <a:r>
-              <a:rPr lang="en-US" dirty="0"/>
+          </a:p>
+          <a:p>
+            <a:r>
+              <a:rPr lang="en-US" sz="3600" dirty="0"/>
               <a:t>Demo</a:t>
             </a:r>
           </a:p>
           <a:p>
             <a:r>
-              <a:rPr lang="en-US" dirty="0"/>
+              <a:rPr lang="en-US" sz="3600" dirty="0"/>
               <a:t>Future Work</a:t>
             </a:r>
           </a:p>
           <a:p>
             <a:r>
-              <a:rPr lang="en-US" dirty="0"/>
+              <a:rPr lang="en-US" sz="3600" dirty="0"/>
               <a:t>Questions</a:t>
             </a:r>
           </a:p>
@@ -5580,11 +5587,13 @@
           </a:xfrm>
         </p:spPr>
         <p:txBody>
-          <a:bodyPr/>
-          <a:lstStyle/>
-          <a:p>
-            <a:r>
-              <a:rPr lang="en-US" dirty="0"/>
+          <a:bodyPr>
+            <a:normAutofit fontScale="90000"/>
+          </a:bodyPr>
+          <a:lstStyle/>
+          <a:p>
+            <a:r>
+              <a:rPr lang="en-US" sz="9600" dirty="0"/>
               <a:t>Background</a:t>
             </a:r>
           </a:p>
@@ -5608,22 +5617,30 @@
         </p:nvSpPr>
         <p:spPr>
           <a:xfrm>
-            <a:off x="684212" y="1510017"/>
-            <a:ext cx="8534400" cy="2491929"/>
+            <a:off x="684212" y="1732792"/>
+            <a:ext cx="8534400" cy="4959794"/>
           </a:xfrm>
         </p:spPr>
         <p:txBody>
-          <a:bodyPr/>
-          <a:lstStyle/>
-          <a:p>
-            <a:r>
-              <a:rPr lang="en-US" dirty="0"/>
+          <a:bodyPr>
+            <a:normAutofit lnSpcReduction="10000"/>
+          </a:bodyPr>
+          <a:lstStyle/>
+          <a:p>
+            <a:r>
+              <a:rPr lang="en-US" sz="3600" dirty="0"/>
               <a:t>This project is an application that students can use to keep track of and control their spending with an easy-to-use streamlined interface.</a:t>
             </a:r>
           </a:p>
           <a:p>
-            <a:r>
-              <a:rPr lang="en-US" dirty="0"/>
+            <a:pPr marL="0" indent="0">
+              <a:buNone/>
+            </a:pPr>
+            <a:endParaRPr lang="en-US" sz="3600" dirty="0"/>
+          </a:p>
+          <a:p>
+            <a:r>
+              <a:rPr lang="en-US" sz="3600" dirty="0"/>
               <a:t>We decided on this because we as low-income college students could use this kind of application in every day life.</a:t>
             </a:r>
           </a:p>
@@ -5677,16 +5694,18 @@
         </p:nvSpPr>
         <p:spPr>
           <a:xfrm>
-            <a:off x="684212" y="225725"/>
+            <a:off x="684212" y="-179431"/>
             <a:ext cx="8534400" cy="1507067"/>
           </a:xfrm>
         </p:spPr>
         <p:txBody>
-          <a:bodyPr/>
-          <a:lstStyle/>
-          <a:p>
-            <a:r>
-              <a:rPr lang="en-US" dirty="0"/>
+          <a:bodyPr>
+            <a:normAutofit/>
+          </a:bodyPr>
+          <a:lstStyle/>
+          <a:p>
+            <a:r>
+              <a:rPr lang="en-US" sz="6600" dirty="0"/>
               <a:t>Approach</a:t>
             </a:r>
           </a:p>
@@ -5711,7 +5730,7 @@
         <p:spPr>
           <a:xfrm>
             <a:off x="684212" y="1327636"/>
-            <a:ext cx="8534400" cy="3478825"/>
+            <a:ext cx="8534400" cy="5304639"/>
           </a:xfrm>
         </p:spPr>
         <p:txBody>
@@ -5721,26 +5740,14 @@
           <a:lstStyle/>
           <a:p>
             <a:r>
-              <a:rPr lang="en-US" dirty="0"/>
-              <a:t>We utilized the relational database </a:t>
-            </a:r>
-            <a:r>
-              <a:rPr lang="en-US" dirty="0" smtClean="0"/>
-              <a:t>tools in Microsoft Access </a:t>
-            </a:r>
-            <a:r>
-              <a:rPr lang="en-US" dirty="0"/>
-              <a:t>to store user account data and SQL to </a:t>
-            </a:r>
-            <a:r>
-              <a:rPr lang="en-US" dirty="0" smtClean="0"/>
-              <a:t>query the database from our C# code. </a:t>
-            </a:r>
-          </a:p>
-          <a:p>
-            <a:r>
-              <a:rPr lang="en-US" dirty="0" smtClean="0"/>
-              <a:t>Additional driver needed for database functionality, available at:</a:t>
+              <a:rPr lang="en-US" sz="2800" dirty="0"/>
+              <a:t>We utilized the relational database tools in Microsoft Access to store user account data and SQL to query the database from our C# code. </a:t>
+            </a:r>
+          </a:p>
+          <a:p>
+            <a:r>
+              <a:rPr lang="en-US" sz="2800" dirty="0"/>
+              <a:t>Additional driver needed for database functionality:</a:t>
             </a:r>
           </a:p>
           <a:p>
@@ -5748,46 +5755,26 @@
               <a:buNone/>
             </a:pPr>
             <a:r>
-              <a:rPr lang="en-US" dirty="0">
-                <a:hlinkClick r:id="rId2"/>
-              </a:rPr>
-              <a:t>https://</a:t>
-            </a:r>
-            <a:r>
-              <a:rPr lang="en-US" dirty="0" smtClean="0">
-                <a:hlinkClick r:id="rId2"/>
-              </a:rPr>
-              <a:t>www.microsoft.com/en-us/download/confirmation.aspx?id=23734</a:t>
-            </a:r>
-            <a:endParaRPr lang="en-US" dirty="0" smtClean="0"/>
+              <a:rPr lang="en-US" sz="2400" dirty="0"/>
+              <a:t>AccessDatabaseEngine.exe (2007 version)</a:t>
+            </a:r>
           </a:p>
           <a:p>
             <a:pPr marL="457200" lvl="1" indent="0">
               <a:buNone/>
             </a:pPr>
-            <a:endParaRPr lang="en-US" dirty="0"/>
-          </a:p>
-          <a:p>
-            <a:r>
-              <a:rPr lang="en-US" dirty="0"/>
-              <a:t>One design pattern we used was the </a:t>
-            </a:r>
-            <a:r>
-              <a:rPr lang="en-US" dirty="0" smtClean="0"/>
-              <a:t>Abstract </a:t>
-            </a:r>
-            <a:r>
-              <a:rPr lang="en-US" dirty="0"/>
-              <a:t>F</a:t>
-            </a:r>
-            <a:r>
-              <a:rPr lang="en-US" dirty="0" smtClean="0"/>
-              <a:t>actory </a:t>
-            </a:r>
-            <a:r>
-              <a:rPr lang="en-US" dirty="0"/>
-              <a:t>pattern to create theming within the application. </a:t>
-            </a:r>
+            <a:endParaRPr lang="en-US" sz="2400" dirty="0"/>
+          </a:p>
+          <a:p>
+            <a:r>
+              <a:rPr lang="en-US" sz="2800" dirty="0"/>
+              <a:t>We used the Abstract Factory pattern to create theming within </a:t>
+            </a:r>
+            <a:r>
+              <a:rPr lang="en-US" sz="2800"/>
+              <a:t>the application.</a:t>
+            </a:r>
+            <a:endParaRPr lang="en-US" sz="2800" dirty="0"/>
           </a:p>
         </p:txBody>
       </p:sp>
@@ -5845,51 +5832,21 @@
         </p:blipFill>
         <p:spPr>
           <a:xfrm>
-            <a:off x="0" y="-1"/>
-            <a:ext cx="5248275" cy="3024566"/>
+            <a:off x="362309" y="0"/>
+            <a:ext cx="11829691" cy="6858000"/>
           </a:xfrm>
         </p:spPr>
       </p:pic>
-      <p:pic>
-        <p:nvPicPr>
-          <p:cNvPr id="7" name="Picture 6">
-            <a:extLst>
-              <a:ext uri="{FF2B5EF4-FFF2-40B4-BE49-F238E27FC236}">
-                <a16:creationId xmlns:a16="http://schemas.microsoft.com/office/drawing/2014/main" id="{1D5B96CC-D486-44E8-B1A3-9E4BBB03F66E}"/>
-              </a:ext>
-            </a:extLst>
-          </p:cNvPr>
-          <p:cNvPicPr>
-            <a:picLocks noChangeAspect="1"/>
-          </p:cNvPicPr>
+      <p:sp>
+        <p:nvSpPr>
+          <p:cNvPr id="3" name="TextBox 2"/>
+          <p:cNvSpPr txBox="1"/>
           <p:nvPr/>
-        </p:nvPicPr>
-        <p:blipFill>
-          <a:blip r:embed="rId3"/>
-          <a:stretch>
-            <a:fillRect/>
-          </a:stretch>
-        </p:blipFill>
+        </p:nvSpPr>
         <p:spPr>
           <a:xfrm>
-            <a:off x="5035724" y="3024565"/>
-            <a:ext cx="7156277" cy="3833436"/>
-          </a:xfrm>
-          <a:prstGeom prst="rect">
-            <a:avLst/>
-          </a:prstGeom>
-        </p:spPr>
-      </p:pic>
-      <p:sp>
-        <p:nvSpPr>
-          <p:cNvPr id="2" name="TextBox 1"/>
-          <p:cNvSpPr txBox="1"/>
-          <p:nvPr/>
-        </p:nvSpPr>
-        <p:spPr>
-          <a:xfrm>
-            <a:off x="9583615" y="140677"/>
-            <a:ext cx="2151185" cy="584775"/>
+            <a:off x="0" y="1059723"/>
+            <a:ext cx="240655" cy="4524315"/>
           </a:xfrm>
           <a:prstGeom prst="rect">
             <a:avLst/>
@@ -5903,70 +5860,9 @@
           <a:lstStyle/>
           <a:p>
             <a:r>
-              <a:rPr lang="en-US" sz="3200" dirty="0" smtClean="0"/>
-              <a:t>Diagrams</a:t>
-            </a:r>
-            <a:endParaRPr lang="en-US" sz="3200" dirty="0"/>
-          </a:p>
-        </p:txBody>
-      </p:sp>
-      <p:sp>
-        <p:nvSpPr>
-          <p:cNvPr id="3" name="TextBox 2"/>
-          <p:cNvSpPr txBox="1"/>
-          <p:nvPr/>
-        </p:nvSpPr>
-        <p:spPr>
-          <a:xfrm>
-            <a:off x="1113692" y="3130062"/>
-            <a:ext cx="2368062" cy="369332"/>
-          </a:xfrm>
-          <a:prstGeom prst="rect">
-            <a:avLst/>
-          </a:prstGeom>
-          <a:noFill/>
-        </p:spPr>
-        <p:txBody>
-          <a:bodyPr wrap="square" rtlCol="0">
-            <a:spAutoFit/>
-          </a:bodyPr>
-          <a:lstStyle/>
-          <a:p>
-            <a:r>
-              <a:rPr lang="en-US" dirty="0" smtClean="0"/>
+              <a:rPr lang="en-US" dirty="0"/>
               <a:t>Program Structure</a:t>
             </a:r>
-            <a:endParaRPr lang="en-US" dirty="0"/>
-          </a:p>
-        </p:txBody>
-      </p:sp>
-      <p:sp>
-        <p:nvSpPr>
-          <p:cNvPr id="4" name="TextBox 3"/>
-          <p:cNvSpPr txBox="1"/>
-          <p:nvPr/>
-        </p:nvSpPr>
-        <p:spPr>
-          <a:xfrm>
-            <a:off x="7707923" y="2573216"/>
-            <a:ext cx="2602523" cy="369332"/>
-          </a:xfrm>
-          <a:prstGeom prst="rect">
-            <a:avLst/>
-          </a:prstGeom>
-          <a:noFill/>
-        </p:spPr>
-        <p:txBody>
-          <a:bodyPr wrap="square" rtlCol="0">
-            <a:spAutoFit/>
-          </a:bodyPr>
-          <a:lstStyle/>
-          <a:p>
-            <a:r>
-              <a:rPr lang="en-US" dirty="0" smtClean="0"/>
-              <a:t>Database Structure</a:t>
-            </a:r>
-            <a:endParaRPr lang="en-US" dirty="0"/>
           </a:p>
         </p:txBody>
       </p:sp>
@@ -6000,131 +5896,69 @@
           <a:chExt cx="0" cy="0"/>
         </a:xfrm>
       </p:grpSpPr>
-      <p:sp>
-        <p:nvSpPr>
-          <p:cNvPr id="2" name="Title 1">
+      <p:pic>
+        <p:nvPicPr>
+          <p:cNvPr id="4" name="Content Placeholder 3">
             <a:extLst>
               <a:ext uri="{FF2B5EF4-FFF2-40B4-BE49-F238E27FC236}">
-                <a16:creationId xmlns:a16="http://schemas.microsoft.com/office/drawing/2014/main" id="{D4DD07E5-12C0-4A1C-B950-85DBBC510EFE}"/>
+                <a16:creationId xmlns:a16="http://schemas.microsoft.com/office/drawing/2014/main" id="{BE2FBBFC-074A-446F-A0AF-704E3D343468}"/>
               </a:ext>
             </a:extLst>
           </p:cNvPr>
-          <p:cNvSpPr>
-            <a:spLocks noGrp="1"/>
-          </p:cNvSpPr>
-          <p:nvPr>
-            <p:ph type="title"/>
-          </p:nvPr>
-        </p:nvSpPr>
+          <p:cNvPicPr>
+            <a:picLocks noGrp="1" noChangeAspect="1"/>
+          </p:cNvPicPr>
+          <p:nvPr>
+            <p:ph idx="1"/>
+          </p:nvPr>
+        </p:nvPicPr>
+        <p:blipFill>
+          <a:blip r:embed="rId2"/>
+          <a:stretch>
+            <a:fillRect/>
+          </a:stretch>
+        </p:blipFill>
         <p:spPr>
           <a:xfrm>
-            <a:off x="0" y="1057275"/>
-            <a:ext cx="9324975" cy="4048125"/>
+            <a:off x="338359" y="0"/>
+            <a:ext cx="12802547" cy="6858000"/>
           </a:xfrm>
+          <a:prstGeom prst="rect">
+            <a:avLst/>
+          </a:prstGeom>
         </p:spPr>
-        <p:txBody>
-          <a:bodyPr>
-            <a:noAutofit/>
+      </p:pic>
+      <p:sp>
+        <p:nvSpPr>
+          <p:cNvPr id="5" name="TextBox 4">
+            <a:extLst>
+              <a:ext uri="{FF2B5EF4-FFF2-40B4-BE49-F238E27FC236}">
+                <a16:creationId xmlns:a16="http://schemas.microsoft.com/office/drawing/2014/main" id="{E384AF08-5DEB-4176-90D2-29672BEE14E3}"/>
+              </a:ext>
+            </a:extLst>
+          </p:cNvPr>
+          <p:cNvSpPr txBox="1"/>
+          <p:nvPr/>
+        </p:nvSpPr>
+        <p:spPr>
+          <a:xfrm>
+            <a:off x="0" y="850637"/>
+            <a:ext cx="256023" cy="4791037"/>
+          </a:xfrm>
+          <a:prstGeom prst="rect">
+            <a:avLst/>
+          </a:prstGeom>
+          <a:noFill/>
+        </p:spPr>
+        <p:txBody>
+          <a:bodyPr wrap="square" rtlCol="0">
+            <a:spAutoFit/>
           </a:bodyPr>
           <a:lstStyle/>
           <a:p>
             <a:r>
-              <a:rPr lang="en-US" sz="4000" cap="none" dirty="0">
-                <a:latin typeface="Consolas" panose="020B0609020204030204" pitchFamily="49" charset="0"/>
-                <a:cs typeface="Consolas" panose="020B0609020204030204" pitchFamily="49" charset="0"/>
-              </a:rPr>
-              <a:t>using system.info.demo</a:t>
-            </a:r>
-            <a:br>
-              <a:rPr lang="en-US" sz="4000" cap="none" dirty="0">
-                <a:latin typeface="Consolas" panose="020B0609020204030204" pitchFamily="49" charset="0"/>
-                <a:cs typeface="Consolas" panose="020B0609020204030204" pitchFamily="49" charset="0"/>
-              </a:rPr>
-            </a:br>
-            <a:r>
-              <a:rPr lang="en-US" sz="4000" cap="none" dirty="0">
-                <a:latin typeface="Consolas" panose="020B0609020204030204" pitchFamily="49" charset="0"/>
-                <a:cs typeface="Consolas" panose="020B0609020204030204" pitchFamily="49" charset="0"/>
-              </a:rPr>
-              <a:t/>
-            </a:r>
-            <a:br>
-              <a:rPr lang="en-US" sz="4000" cap="none" dirty="0">
-                <a:latin typeface="Consolas" panose="020B0609020204030204" pitchFamily="49" charset="0"/>
-                <a:cs typeface="Consolas" panose="020B0609020204030204" pitchFamily="49" charset="0"/>
-              </a:rPr>
-            </a:br>
-            <a:r>
-              <a:rPr lang="en-US" sz="4000" cap="none" dirty="0">
-                <a:latin typeface="Consolas" panose="020B0609020204030204" pitchFamily="49" charset="0"/>
-                <a:cs typeface="Consolas" panose="020B0609020204030204" pitchFamily="49" charset="0"/>
-              </a:rPr>
-              <a:t>static void main() </a:t>
-            </a:r>
-            <a:br>
-              <a:rPr lang="en-US" sz="4000" cap="none" dirty="0">
-                <a:latin typeface="Consolas" panose="020B0609020204030204" pitchFamily="49" charset="0"/>
-                <a:cs typeface="Consolas" panose="020B0609020204030204" pitchFamily="49" charset="0"/>
-              </a:rPr>
-            </a:br>
-            <a:r>
-              <a:rPr lang="en-US" sz="4000" cap="none" dirty="0">
-                <a:latin typeface="Consolas" panose="020B0609020204030204" pitchFamily="49" charset="0"/>
-                <a:cs typeface="Consolas" panose="020B0609020204030204" pitchFamily="49" charset="0"/>
-              </a:rPr>
-              <a:t>{</a:t>
-            </a:r>
-            <a:br>
-              <a:rPr lang="en-US" sz="4000" cap="none" dirty="0">
-                <a:latin typeface="Consolas" panose="020B0609020204030204" pitchFamily="49" charset="0"/>
-                <a:cs typeface="Consolas" panose="020B0609020204030204" pitchFamily="49" charset="0"/>
-              </a:rPr>
-            </a:br>
-            <a:r>
-              <a:rPr lang="en-US" sz="4000" cap="none" dirty="0">
-                <a:latin typeface="Consolas" panose="020B0609020204030204" pitchFamily="49" charset="0"/>
-                <a:cs typeface="Consolas" panose="020B0609020204030204" pitchFamily="49" charset="0"/>
-              </a:rPr>
-              <a:t>	Demo projectDemo = new Demo();</a:t>
-            </a:r>
-            <a:br>
-              <a:rPr lang="en-US" sz="4000" cap="none" dirty="0">
-                <a:latin typeface="Consolas" panose="020B0609020204030204" pitchFamily="49" charset="0"/>
-                <a:cs typeface="Consolas" panose="020B0609020204030204" pitchFamily="49" charset="0"/>
-              </a:rPr>
-            </a:br>
-            <a:r>
-              <a:rPr lang="en-US" sz="4000" cap="none" dirty="0">
-                <a:latin typeface="Consolas" panose="020B0609020204030204" pitchFamily="49" charset="0"/>
-                <a:cs typeface="Consolas" panose="020B0609020204030204" pitchFamily="49" charset="0"/>
-              </a:rPr>
-              <a:t>	projectDemo.make_good();</a:t>
-            </a:r>
-            <a:br>
-              <a:rPr lang="en-US" sz="4000" cap="none" dirty="0">
-                <a:latin typeface="Consolas" panose="020B0609020204030204" pitchFamily="49" charset="0"/>
-                <a:cs typeface="Consolas" panose="020B0609020204030204" pitchFamily="49" charset="0"/>
-              </a:rPr>
-            </a:br>
-            <a:r>
-              <a:rPr lang="en-US" sz="4000" cap="none" dirty="0">
-                <a:latin typeface="Consolas" panose="020B0609020204030204" pitchFamily="49" charset="0"/>
-                <a:cs typeface="Consolas" panose="020B0609020204030204" pitchFamily="49" charset="0"/>
-              </a:rPr>
-              <a:t>	projectDemo.begin();</a:t>
-            </a:r>
-            <a:br>
-              <a:rPr lang="en-US" sz="4000" cap="none" dirty="0">
-                <a:latin typeface="Consolas" panose="020B0609020204030204" pitchFamily="49" charset="0"/>
-                <a:cs typeface="Consolas" panose="020B0609020204030204" pitchFamily="49" charset="0"/>
-              </a:rPr>
-            </a:br>
-            <a:r>
-              <a:rPr lang="en-US" sz="4000" cap="none" dirty="0">
-                <a:latin typeface="Consolas" panose="020B0609020204030204" pitchFamily="49" charset="0"/>
-                <a:cs typeface="Consolas" panose="020B0609020204030204" pitchFamily="49" charset="0"/>
-              </a:rPr>
-              <a:t>}</a:t>
+              <a:rPr lang="en-US" dirty="0"/>
+              <a:t>Database Structure</a:t>
             </a:r>
           </a:p>
         </p:txBody>
@@ -6132,7 +5966,7 @@
     </p:spTree>
     <p:extLst>
       <p:ext uri="{BB962C8B-B14F-4D97-AF65-F5344CB8AC3E}">
-        <p14:creationId xmlns:p14="http://schemas.microsoft.com/office/powerpoint/2010/main" val="4079616804"/>
+        <p14:creationId xmlns:p14="http://schemas.microsoft.com/office/powerpoint/2010/main" val="2831444261"/>
       </p:ext>
     </p:extLst>
   </p:cSld>
@@ -6182,11 +6016,13 @@
           </a:xfrm>
         </p:spPr>
         <p:txBody>
-          <a:bodyPr/>
-          <a:lstStyle/>
-          <a:p>
-            <a:r>
-              <a:rPr lang="en-US" dirty="0"/>
+          <a:bodyPr>
+            <a:normAutofit/>
+          </a:bodyPr>
+          <a:lstStyle/>
+          <a:p>
+            <a:r>
+              <a:rPr lang="en-US" sz="7200" dirty="0"/>
               <a:t>Future work</a:t>
             </a:r>
           </a:p>
@@ -6210,25 +6046,19 @@
         </p:nvSpPr>
         <p:spPr>
           <a:xfrm>
-            <a:off x="684212" y="1350191"/>
+            <a:off x="684212" y="1867776"/>
             <a:ext cx="8534400" cy="3615267"/>
           </a:xfrm>
         </p:spPr>
         <p:txBody>
-          <a:bodyPr/>
-          <a:lstStyle/>
-          <a:p>
-            <a:r>
-              <a:rPr lang="en-US" dirty="0"/>
-              <a:t>In the future we hope to expand on everything we have achieved already as well as implement real bank APIs and </a:t>
-            </a:r>
-            <a:r>
-              <a:rPr lang="en-US" dirty="0" smtClean="0"/>
-              <a:t>if possible, </a:t>
-            </a:r>
-            <a:r>
-              <a:rPr lang="en-US" dirty="0"/>
-              <a:t>add a new investment section.</a:t>
+          <a:bodyPr>
+            <a:normAutofit/>
+          </a:bodyPr>
+          <a:lstStyle/>
+          <a:p>
+            <a:r>
+              <a:rPr lang="en-US" sz="3600" dirty="0"/>
+              <a:t>In the future we hope to expand on everything we have achieved already as well as implement real bank APIs and if possible, add a new investment section.</a:t>
             </a:r>
           </a:p>
         </p:txBody>
@@ -6286,11 +6116,13 @@
           </a:xfrm>
         </p:spPr>
         <p:txBody>
-          <a:bodyPr/>
-          <a:lstStyle/>
-          <a:p>
-            <a:r>
-              <a:rPr lang="en-US" dirty="0"/>
+          <a:bodyPr>
+            <a:normAutofit/>
+          </a:bodyPr>
+          <a:lstStyle/>
+          <a:p>
+            <a:r>
+              <a:rPr lang="en-US" sz="4800" dirty="0"/>
               <a:t>Questions</a:t>
             </a:r>
           </a:p>
@@ -6314,58 +6146,49 @@
         </p:nvSpPr>
         <p:spPr>
           <a:xfrm>
-            <a:off x="684212" y="1350191"/>
-            <a:ext cx="8534400" cy="3615267"/>
+            <a:off x="126445" y="1384697"/>
+            <a:ext cx="10061351" cy="4679673"/>
           </a:xfrm>
         </p:spPr>
         <p:txBody>
-          <a:bodyPr/>
-          <a:lstStyle/>
-          <a:p>
-            <a:r>
-              <a:rPr lang="en-US" dirty="0" smtClean="0">
+          <a:bodyPr>
+            <a:normAutofit/>
+          </a:bodyPr>
+          <a:lstStyle/>
+          <a:p>
+            <a:r>
+              <a:rPr lang="en-US" sz="3200" dirty="0">
                 <a:hlinkClick r:id="rId2"/>
               </a:rPr>
-              <a:t>lfreeze@utm</a:t>
-            </a:r>
-            <a:r>
-              <a:rPr lang="en-US" dirty="0" smtClean="0">
-                <a:hlinkClick r:id="rId2"/>
-              </a:rPr>
-              <a:t>.edu</a:t>
-            </a:r>
-            <a:endParaRPr lang="en-US" dirty="0"/>
-          </a:p>
-          <a:p>
-            <a:r>
-              <a:rPr lang="en-US" dirty="0">
+              <a:t>lfreeze@utm.edu</a:t>
+            </a:r>
+            <a:endParaRPr lang="en-US" sz="3200" dirty="0"/>
+          </a:p>
+          <a:p>
+            <a:r>
+              <a:rPr lang="en-US" sz="3200" dirty="0">
                 <a:hlinkClick r:id="rId3"/>
               </a:rPr>
               <a:t>bremwhit@ut.utm.edu</a:t>
             </a:r>
-            <a:endParaRPr lang="en-US" dirty="0"/>
-          </a:p>
-          <a:p>
-            <a:endParaRPr lang="en-US" dirty="0"/>
-          </a:p>
-          <a:p>
-            <a:r>
-              <a:rPr lang="en-US" dirty="0"/>
+            <a:endParaRPr lang="en-US" sz="3200" dirty="0"/>
+          </a:p>
+          <a:p>
+            <a:endParaRPr lang="en-US" sz="3200" dirty="0"/>
+          </a:p>
+          <a:p>
+            <a:r>
+              <a:rPr lang="en-US" sz="3200" dirty="0"/>
               <a:t>The Repo: </a:t>
             </a:r>
-            <a:endParaRPr lang="en-US" dirty="0" smtClean="0"/>
           </a:p>
           <a:p>
             <a:pPr marL="457200" lvl="1" indent="0">
               <a:buNone/>
             </a:pPr>
             <a:r>
-              <a:rPr lang="en-US" dirty="0" smtClean="0"/>
-              <a:t>https</a:t>
-            </a:r>
-            <a:r>
-              <a:rPr lang="en-US" dirty="0"/>
-              <a:t>://github.com/lucianfreeze/CSCI352-Project-Freeze-Whitson</a:t>
+              <a:rPr lang="en-US" sz="2800" dirty="0"/>
+              <a:t>https://github.com/lucianfreeze/CSCI352-Project-Freeze-Whitson</a:t>
             </a:r>
           </a:p>
         </p:txBody>

</xml_diff>